<commit_message>
I added my slides-maria
</commit_message>
<xml_diff>
--- a/Group I -Presentation.pptx
+++ b/Group I -Presentation.pptx
@@ -11,9 +11,11 @@
     <p:sldId id="259" r:id="rId5"/>
     <p:sldId id="260" r:id="rId6"/>
     <p:sldId id="261" r:id="rId7"/>
-    <p:sldId id="262" r:id="rId8"/>
-    <p:sldId id="263" r:id="rId9"/>
-    <p:sldId id="264" r:id="rId10"/>
+    <p:sldId id="267" r:id="rId8"/>
+    <p:sldId id="265" r:id="rId9"/>
+    <p:sldId id="266" r:id="rId10"/>
+    <p:sldId id="263" r:id="rId11"/>
+    <p:sldId id="264" r:id="rId12"/>
   </p:sldIdLst>
   <p:sldSz cx="12192000" cy="6858000"/>
   <p:notesSz cx="6858000" cy="9144000"/>
@@ -112,6 +114,11 @@
       </a:defRPr>
     </a:lvl9pPr>
   </p:defaultTextStyle>
+  <p:extLst>
+    <p:ext uri="{EFAFB233-063F-42B5-8137-9DF3F51BA10A}">
+      <p15:sldGuideLst xmlns:p15="http://schemas.microsoft.com/office/powerpoint/2012/main"/>
+    </p:ext>
+  </p:extLst>
 </p:presentation>
 </file>
 
@@ -278,7 +285,7 @@
           <a:p>
             <a:fld id="{2C17EEDD-87DB-3740-A114-3CACE493933E}" type="datetimeFigureOut">
               <a:rPr lang="en-US" smtClean="0"/>
-              <a:t>11/7/18</a:t>
+              <a:t>11/8/18</a:t>
             </a:fld>
             <a:endParaRPr lang="en-US"/>
           </a:p>
@@ -448,7 +455,7 @@
           <a:p>
             <a:fld id="{2C17EEDD-87DB-3740-A114-3CACE493933E}" type="datetimeFigureOut">
               <a:rPr lang="en-US" smtClean="0"/>
-              <a:t>11/7/18</a:t>
+              <a:t>11/8/18</a:t>
             </a:fld>
             <a:endParaRPr lang="en-US"/>
           </a:p>
@@ -628,7 +635,7 @@
           <a:p>
             <a:fld id="{2C17EEDD-87DB-3740-A114-3CACE493933E}" type="datetimeFigureOut">
               <a:rPr lang="en-US" smtClean="0"/>
-              <a:t>11/7/18</a:t>
+              <a:t>11/8/18</a:t>
             </a:fld>
             <a:endParaRPr lang="en-US"/>
           </a:p>
@@ -798,7 +805,7 @@
           <a:p>
             <a:fld id="{2C17EEDD-87DB-3740-A114-3CACE493933E}" type="datetimeFigureOut">
               <a:rPr lang="en-US" smtClean="0"/>
-              <a:t>11/7/18</a:t>
+              <a:t>11/8/18</a:t>
             </a:fld>
             <a:endParaRPr lang="en-US"/>
           </a:p>
@@ -1066,7 +1073,7 @@
           <a:p>
             <a:fld id="{2C17EEDD-87DB-3740-A114-3CACE493933E}" type="datetimeFigureOut">
               <a:rPr lang="en-US" smtClean="0"/>
-              <a:t>11/7/18</a:t>
+              <a:t>11/8/18</a:t>
             </a:fld>
             <a:endParaRPr lang="en-US"/>
           </a:p>
@@ -1298,7 +1305,7 @@
           <a:p>
             <a:fld id="{2C17EEDD-87DB-3740-A114-3CACE493933E}" type="datetimeFigureOut">
               <a:rPr lang="en-US" smtClean="0"/>
-              <a:t>11/7/18</a:t>
+              <a:t>11/8/18</a:t>
             </a:fld>
             <a:endParaRPr lang="en-US"/>
           </a:p>
@@ -1657,7 +1664,7 @@
           <a:p>
             <a:fld id="{2C17EEDD-87DB-3740-A114-3CACE493933E}" type="datetimeFigureOut">
               <a:rPr lang="en-US" smtClean="0"/>
-              <a:t>11/7/18</a:t>
+              <a:t>11/8/18</a:t>
             </a:fld>
             <a:endParaRPr lang="en-US"/>
           </a:p>
@@ -1798,7 +1805,7 @@
           <a:p>
             <a:fld id="{2C17EEDD-87DB-3740-A114-3CACE493933E}" type="datetimeFigureOut">
               <a:rPr lang="en-US" smtClean="0"/>
-              <a:t>11/7/18</a:t>
+              <a:t>11/8/18</a:t>
             </a:fld>
             <a:endParaRPr lang="en-US"/>
           </a:p>
@@ -1893,7 +1900,7 @@
           <a:p>
             <a:fld id="{2C17EEDD-87DB-3740-A114-3CACE493933E}" type="datetimeFigureOut">
               <a:rPr lang="en-US" smtClean="0"/>
-              <a:t>11/7/18</a:t>
+              <a:t>11/8/18</a:t>
             </a:fld>
             <a:endParaRPr lang="en-US"/>
           </a:p>
@@ -2250,7 +2257,7 @@
           <a:p>
             <a:fld id="{2C17EEDD-87DB-3740-A114-3CACE493933E}" type="datetimeFigureOut">
               <a:rPr lang="en-US" smtClean="0"/>
-              <a:t>11/7/18</a:t>
+              <a:t>11/8/18</a:t>
             </a:fld>
             <a:endParaRPr lang="en-US"/>
           </a:p>
@@ -2607,7 +2614,7 @@
           <a:p>
             <a:fld id="{2C17EEDD-87DB-3740-A114-3CACE493933E}" type="datetimeFigureOut">
               <a:rPr lang="en-US" smtClean="0"/>
-              <a:t>11/7/18</a:t>
+              <a:t>11/8/18</a:t>
             </a:fld>
             <a:endParaRPr lang="en-US"/>
           </a:p>
@@ -2848,7 +2855,7 @@
           <a:p>
             <a:fld id="{2C17EEDD-87DB-3740-A114-3CACE493933E}" type="datetimeFigureOut">
               <a:rPr lang="en-US" smtClean="0"/>
-              <a:t>11/7/18</a:t>
+              <a:t>11/8/18</a:t>
             </a:fld>
             <a:endParaRPr lang="en-US"/>
           </a:p>
@@ -3328,12 +3335,14 @@
           </a:xfrm>
         </p:spPr>
         <p:txBody>
-          <a:bodyPr/>
-          <a:lstStyle/>
-          <a:p>
-            <a:r>
-              <a:rPr lang="en-US" dirty="0"/>
-              <a:t>MARIA-TITLE</a:t>
+          <a:bodyPr>
+            <a:normAutofit fontScale="90000"/>
+          </a:bodyPr>
+          <a:lstStyle/>
+          <a:p>
+            <a:r>
+              <a:rPr lang="en-US" dirty="0"/>
+              <a:t>MARIA-Demographics and food</a:t>
             </a:r>
           </a:p>
         </p:txBody>
@@ -3415,6 +3424,230 @@
     <p:extLst>
       <p:ext uri="{BB962C8B-B14F-4D97-AF65-F5344CB8AC3E}">
         <p14:creationId xmlns:p14="http://schemas.microsoft.com/office/powerpoint/2010/main" val="2409153795"/>
+      </p:ext>
+    </p:extLst>
+  </p:cSld>
+  <p:clrMapOvr>
+    <a:masterClrMapping/>
+  </p:clrMapOvr>
+</p:sld>
+</file>
+
+<file path=ppt/slides/slide10.xml><?xml version="1.0" encoding="utf-8"?>
+<p:sld xmlns:a="http://schemas.openxmlformats.org/drawingml/2006/main" xmlns:r="http://schemas.openxmlformats.org/officeDocument/2006/relationships" xmlns:p="http://schemas.openxmlformats.org/presentationml/2006/main">
+  <p:cSld>
+    <p:spTree>
+      <p:nvGrpSpPr>
+        <p:cNvPr id="1" name=""/>
+        <p:cNvGrpSpPr/>
+        <p:nvPr/>
+      </p:nvGrpSpPr>
+      <p:grpSpPr>
+        <a:xfrm>
+          <a:off x="0" y="0"/>
+          <a:ext cx="0" cy="0"/>
+          <a:chOff x="0" y="0"/>
+          <a:chExt cx="0" cy="0"/>
+        </a:xfrm>
+      </p:grpSpPr>
+      <p:sp>
+        <p:nvSpPr>
+          <p:cNvPr id="2" name="Title 1">
+            <a:extLst>
+              <a:ext uri="{FF2B5EF4-FFF2-40B4-BE49-F238E27FC236}">
+                <a16:creationId xmlns:a16="http://schemas.microsoft.com/office/drawing/2014/main" id="{30D72CAA-86AE-D240-8BF9-AE72ADE0F5EA}"/>
+              </a:ext>
+            </a:extLst>
+          </p:cNvPr>
+          <p:cNvSpPr>
+            <a:spLocks noGrp="1"/>
+          </p:cNvSpPr>
+          <p:nvPr>
+            <p:ph type="title"/>
+          </p:nvPr>
+        </p:nvSpPr>
+        <p:spPr/>
+        <p:txBody>
+          <a:bodyPr/>
+          <a:lstStyle/>
+          <a:p>
+            <a:r>
+              <a:rPr lang="en-US" dirty="0"/>
+              <a:t>COEL- Data Analysis</a:t>
+            </a:r>
+          </a:p>
+        </p:txBody>
+      </p:sp>
+      <p:sp>
+        <p:nvSpPr>
+          <p:cNvPr id="3" name="Content Placeholder 2">
+            <a:extLst>
+              <a:ext uri="{FF2B5EF4-FFF2-40B4-BE49-F238E27FC236}">
+                <a16:creationId xmlns:a16="http://schemas.microsoft.com/office/drawing/2014/main" id="{65E54FE2-3120-A747-8A53-EF31D502AB5D}"/>
+              </a:ext>
+            </a:extLst>
+          </p:cNvPr>
+          <p:cNvSpPr>
+            <a:spLocks noGrp="1"/>
+          </p:cNvSpPr>
+          <p:nvPr>
+            <p:ph idx="1"/>
+          </p:nvPr>
+        </p:nvSpPr>
+        <p:spPr/>
+        <p:txBody>
+          <a:bodyPr>
+            <a:normAutofit/>
+          </a:bodyPr>
+          <a:lstStyle/>
+          <a:p>
+            <a:r>
+              <a:rPr lang="en-US" dirty="0"/>
+              <a:t>Data Analysis</a:t>
+            </a:r>
+          </a:p>
+          <a:p>
+            <a:endParaRPr lang="en-US" dirty="0"/>
+          </a:p>
+          <a:p>
+            <a:r>
+              <a:rPr lang="en-US" dirty="0"/>
+              <a:t>Discuss the steps you took to analyze the data and answer each question you asked in your proposal</a:t>
+            </a:r>
+          </a:p>
+          <a:p>
+            <a:r>
+              <a:rPr lang="en-US" dirty="0"/>
+              <a:t>Present and discuss interesting figures developed during analysis, ideally with the help of </a:t>
+            </a:r>
+            <a:r>
+              <a:rPr lang="en-US" dirty="0" err="1"/>
+              <a:t>Jupyter</a:t>
+            </a:r>
+            <a:r>
+              <a:rPr lang="en-US" dirty="0"/>
+              <a:t> Notebook</a:t>
+            </a:r>
+          </a:p>
+          <a:p>
+            <a:r>
+              <a:rPr lang="en-US" dirty="0"/>
+              <a:t>Discuss your findings. Did you find what you expected to find? If not, why not? What inferences or general conclusions can you draw from your analysis?</a:t>
+            </a:r>
+          </a:p>
+          <a:p>
+            <a:endParaRPr lang="en-US" dirty="0"/>
+          </a:p>
+          <a:p>
+            <a:endParaRPr lang="en-US" dirty="0"/>
+          </a:p>
+        </p:txBody>
+      </p:sp>
+    </p:spTree>
+    <p:extLst>
+      <p:ext uri="{BB962C8B-B14F-4D97-AF65-F5344CB8AC3E}">
+        <p14:creationId xmlns:p14="http://schemas.microsoft.com/office/powerpoint/2010/main" val="794689630"/>
+      </p:ext>
+    </p:extLst>
+  </p:cSld>
+  <p:clrMapOvr>
+    <a:masterClrMapping/>
+  </p:clrMapOvr>
+</p:sld>
+</file>
+
+<file path=ppt/slides/slide11.xml><?xml version="1.0" encoding="utf-8"?>
+<p:sld xmlns:a="http://schemas.openxmlformats.org/drawingml/2006/main" xmlns:r="http://schemas.openxmlformats.org/officeDocument/2006/relationships" xmlns:p="http://schemas.openxmlformats.org/presentationml/2006/main">
+  <p:cSld>
+    <p:spTree>
+      <p:nvGrpSpPr>
+        <p:cNvPr id="1" name=""/>
+        <p:cNvGrpSpPr/>
+        <p:nvPr/>
+      </p:nvGrpSpPr>
+      <p:grpSpPr>
+        <a:xfrm>
+          <a:off x="0" y="0"/>
+          <a:ext cx="0" cy="0"/>
+          <a:chOff x="0" y="0"/>
+          <a:chExt cx="0" cy="0"/>
+        </a:xfrm>
+      </p:grpSpPr>
+      <p:sp>
+        <p:nvSpPr>
+          <p:cNvPr id="2" name="Title 1">
+            <a:extLst>
+              <a:ext uri="{FF2B5EF4-FFF2-40B4-BE49-F238E27FC236}">
+                <a16:creationId xmlns:a16="http://schemas.microsoft.com/office/drawing/2014/main" id="{90C6AC86-6EBA-6848-955C-BE69B2959DD4}"/>
+              </a:ext>
+            </a:extLst>
+          </p:cNvPr>
+          <p:cNvSpPr>
+            <a:spLocks noGrp="1"/>
+          </p:cNvSpPr>
+          <p:nvPr>
+            <p:ph type="title"/>
+          </p:nvPr>
+        </p:nvSpPr>
+        <p:spPr/>
+        <p:txBody>
+          <a:bodyPr>
+            <a:normAutofit/>
+          </a:bodyPr>
+          <a:lstStyle/>
+          <a:p>
+            <a:r>
+              <a:rPr lang="en-US" dirty="0"/>
+              <a:t>COEL-Post Mortem</a:t>
+            </a:r>
+            <a:br>
+              <a:rPr lang="en-US" dirty="0"/>
+            </a:br>
+            <a:endParaRPr lang="en-US" dirty="0"/>
+          </a:p>
+        </p:txBody>
+      </p:sp>
+      <p:sp>
+        <p:nvSpPr>
+          <p:cNvPr id="3" name="Content Placeholder 2">
+            <a:extLst>
+              <a:ext uri="{FF2B5EF4-FFF2-40B4-BE49-F238E27FC236}">
+                <a16:creationId xmlns:a16="http://schemas.microsoft.com/office/drawing/2014/main" id="{497B7C63-3284-4445-ACBF-9AD749173B04}"/>
+              </a:ext>
+            </a:extLst>
+          </p:cNvPr>
+          <p:cNvSpPr>
+            <a:spLocks noGrp="1"/>
+          </p:cNvSpPr>
+          <p:nvPr>
+            <p:ph idx="1"/>
+          </p:nvPr>
+        </p:nvSpPr>
+        <p:spPr/>
+        <p:txBody>
+          <a:bodyPr/>
+          <a:lstStyle/>
+          <a:p>
+            <a:endParaRPr lang="en-US" dirty="0"/>
+          </a:p>
+          <a:p>
+            <a:r>
+              <a:rPr lang="en-US" dirty="0"/>
+              <a:t>  Discuss any difficulties that arose, and how you dealt with them</a:t>
+            </a:r>
+          </a:p>
+          <a:p>
+            <a:r>
+              <a:rPr lang="en-US" dirty="0"/>
+              <a:t>  Discuss any additional questions that came up, but which you didn't have time to answer: What would you research next, if you had two more weeks?</a:t>
+            </a:r>
+          </a:p>
+        </p:txBody>
+      </p:sp>
+    </p:spTree>
+    <p:extLst>
+      <p:ext uri="{BB962C8B-B14F-4D97-AF65-F5344CB8AC3E}">
+        <p14:creationId xmlns:p14="http://schemas.microsoft.com/office/powerpoint/2010/main" val="654083922"/>
       </p:ext>
     </p:extLst>
   </p:cSld>
@@ -3487,18 +3720,55 @@
         </p:nvSpPr>
         <p:spPr/>
         <p:txBody>
-          <a:bodyPr/>
-          <a:lstStyle/>
-          <a:p>
-            <a:r>
-              <a:rPr lang="en-US" dirty="0"/>
-              <a:t> Define the core message or hypothesis of your project.</a:t>
-            </a:r>
-          </a:p>
-          <a:p>
-            <a:r>
-              <a:rPr lang="en-US" dirty="0"/>
-              <a:t> Describe the questions you asked, and _why_ you asked them</a:t>
+          <a:bodyPr>
+            <a:normAutofit fontScale="92500" lnSpcReduction="20000"/>
+          </a:bodyPr>
+          <a:lstStyle/>
+          <a:p>
+            <a:r>
+              <a:rPr lang="en-US" dirty="0"/>
+              <a:t> Core message/hypothesis: Demographics effect what Americans eat, how much they spend and how they review restaurants</a:t>
+            </a:r>
+          </a:p>
+          <a:p>
+            <a:r>
+              <a:rPr lang="en-US" dirty="0"/>
+              <a:t>Describe the questions you asked, and _why_ you asked them</a:t>
+            </a:r>
+          </a:p>
+          <a:p>
+            <a:r>
+              <a:rPr lang="en-US" dirty="0"/>
+              <a:t>Insert your question:</a:t>
+            </a:r>
+          </a:p>
+          <a:p>
+            <a:r>
+              <a:rPr lang="en-US" dirty="0"/>
+              <a:t>1. Does income per capita affect the popularity of $$$ and $ restaurants?</a:t>
+            </a:r>
+          </a:p>
+          <a:p>
+            <a:r>
+              <a:rPr lang="en-US" dirty="0"/>
+              <a:t>2. Martel</a:t>
+            </a:r>
+          </a:p>
+          <a:p>
+            <a:r>
+              <a:rPr lang="en-US" dirty="0"/>
+              <a:t>3. </a:t>
+            </a:r>
+            <a:r>
+              <a:rPr lang="en-US" dirty="0" err="1"/>
+              <a:t>Coel</a:t>
+            </a:r>
+            <a:endParaRPr lang="en-US" dirty="0"/>
+          </a:p>
+          <a:p>
+            <a:r>
+              <a:rPr lang="en-US" dirty="0"/>
+              <a:t>4. Emily</a:t>
             </a:r>
           </a:p>
           <a:p>
@@ -3768,7 +4038,7 @@
           <a:p>
             <a:r>
               <a:rPr lang="en-US" dirty="0"/>
-              <a:t>Data Analysis-Emily</a:t>
+              <a:t>Emily- Data Analysis</a:t>
             </a:r>
             <a:br>
               <a:rPr lang="en-US" dirty="0"/>
@@ -3898,7 +4168,7 @@
           <a:p>
             <a:r>
               <a:rPr lang="en-US" dirty="0"/>
-              <a:t>Data Analysis-Martel</a:t>
+              <a:t>Martel- Data Analysis</a:t>
             </a:r>
           </a:p>
         </p:txBody>
@@ -4000,7 +4270,7 @@
           <p:cNvPr id="2" name="Title 1">
             <a:extLst>
               <a:ext uri="{FF2B5EF4-FFF2-40B4-BE49-F238E27FC236}">
-                <a16:creationId xmlns:a16="http://schemas.microsoft.com/office/drawing/2014/main" id="{320384C4-19F3-5B44-8E08-FB80750CF85A}"/>
+                <a16:creationId xmlns:a16="http://schemas.microsoft.com/office/drawing/2014/main" id="{00C68F09-26F0-4A46-93FC-636D7239E5B1}"/>
               </a:ext>
             </a:extLst>
           </p:cNvPr>
@@ -4013,85 +4283,111 @@
         </p:nvSpPr>
         <p:spPr/>
         <p:txBody>
-          <a:bodyPr/>
-          <a:lstStyle/>
-          <a:p>
-            <a:r>
-              <a:rPr lang="en-US" dirty="0"/>
-              <a:t>Data Analysis-Maria</a:t>
-            </a:r>
-          </a:p>
-        </p:txBody>
-      </p:sp>
-      <p:sp>
-        <p:nvSpPr>
-          <p:cNvPr id="3" name="Content Placeholder 2">
+          <a:bodyPr>
+            <a:normAutofit fontScale="90000"/>
+          </a:bodyPr>
+          <a:lstStyle/>
+          <a:p>
+            <a:r>
+              <a:rPr lang="en-US" dirty="0"/>
+              <a:t>Maria-Does income per capita affect the popularity of $$$ restaurants?</a:t>
+            </a:r>
+            <a:endParaRPr lang="en-US" b="1" dirty="0"/>
+          </a:p>
+        </p:txBody>
+      </p:sp>
+      <p:pic>
+        <p:nvPicPr>
+          <p:cNvPr id="5" name="Content Placeholder 4">
             <a:extLst>
               <a:ext uri="{FF2B5EF4-FFF2-40B4-BE49-F238E27FC236}">
-                <a16:creationId xmlns:a16="http://schemas.microsoft.com/office/drawing/2014/main" id="{44F47BB6-B09F-D244-A7C7-83927527D87A}"/>
+                <a16:creationId xmlns:a16="http://schemas.microsoft.com/office/drawing/2014/main" id="{B26DEDEB-B537-5747-AD3B-7D40F887FB25}"/>
               </a:ext>
             </a:extLst>
           </p:cNvPr>
-          <p:cNvSpPr>
-            <a:spLocks noGrp="1"/>
-          </p:cNvSpPr>
+          <p:cNvPicPr>
+            <a:picLocks noGrp="1" noChangeAspect="1"/>
+          </p:cNvPicPr>
           <p:nvPr>
             <p:ph idx="1"/>
           </p:nvPr>
-        </p:nvSpPr>
-        <p:spPr/>
-        <p:txBody>
-          <a:bodyPr>
-            <a:normAutofit/>
+        </p:nvPicPr>
+        <p:blipFill>
+          <a:blip r:embed="rId2"/>
+          <a:stretch>
+            <a:fillRect/>
+          </a:stretch>
+        </p:blipFill>
+        <p:spPr>
+          <a:xfrm>
+            <a:off x="58990" y="2687696"/>
+            <a:ext cx="11994466" cy="1799170"/>
+          </a:xfrm>
+        </p:spPr>
+      </p:pic>
+      <p:sp>
+        <p:nvSpPr>
+          <p:cNvPr id="6" name="TextBox 5">
+            <a:extLst>
+              <a:ext uri="{FF2B5EF4-FFF2-40B4-BE49-F238E27FC236}">
+                <a16:creationId xmlns:a16="http://schemas.microsoft.com/office/drawing/2014/main" id="{594B229B-D37D-8F48-A50D-98605A5108FA}"/>
+              </a:ext>
+            </a:extLst>
+          </p:cNvPr>
+          <p:cNvSpPr txBox="1"/>
+          <p:nvPr/>
+        </p:nvSpPr>
+        <p:spPr>
+          <a:xfrm>
+            <a:off x="1920240" y="4829695"/>
+            <a:ext cx="8395855" cy="923330"/>
+          </a:xfrm>
+          <a:prstGeom prst="rect">
+            <a:avLst/>
+          </a:prstGeom>
+          <a:noFill/>
+        </p:spPr>
+        <p:txBody>
+          <a:bodyPr wrap="square" rtlCol="0">
+            <a:spAutoFit/>
           </a:bodyPr>
           <a:lstStyle/>
           <a:p>
-            <a:r>
-              <a:rPr lang="en-US" dirty="0"/>
-              <a:t>Data Analysis</a:t>
-            </a:r>
-          </a:p>
-          <a:p>
-            <a:endParaRPr lang="en-US" dirty="0"/>
-          </a:p>
-          <a:p>
-            <a:r>
-              <a:rPr lang="en-US" dirty="0"/>
-              <a:t> Discuss the steps you took to analyze the data and answer each question you asked in your proposal</a:t>
-            </a:r>
-          </a:p>
-          <a:p>
-            <a:r>
-              <a:rPr lang="en-US" dirty="0"/>
-              <a:t> Present and discuss interesting figures developed during analysis, ideally with the help of </a:t>
-            </a:r>
-            <a:r>
-              <a:rPr lang="en-US" dirty="0" err="1"/>
-              <a:t>Jupyter</a:t>
-            </a:r>
-            <a:r>
-              <a:rPr lang="en-US" dirty="0"/>
-              <a:t> Notebook</a:t>
-            </a:r>
-          </a:p>
-          <a:p>
-            <a:r>
-              <a:rPr lang="en-US" dirty="0"/>
-              <a:t>Discuss your findings. Did you find what you expected to find? If not, why not? What inferences or general conclusions can you draw from your analysis?</a:t>
-            </a:r>
-          </a:p>
-          <a:p>
-            <a:endParaRPr lang="en-US" dirty="0"/>
-          </a:p>
-          <a:p>
-            <a:endParaRPr lang="en-US" dirty="0"/>
+            <a:pPr marL="285750" indent="-285750">
+              <a:buFont typeface="Arial" panose="020B0604020202020204" pitchFamily="34" charset="0"/>
+              <a:buChar char="•"/>
+            </a:pPr>
+            <a:r>
+              <a:rPr lang="en-US" dirty="0"/>
+              <a:t>California : Few $$$ restaurants compared to per capita income </a:t>
+            </a:r>
+          </a:p>
+          <a:p>
+            <a:pPr marL="285750" indent="-285750">
+              <a:buFont typeface="Arial" panose="020B0604020202020204" pitchFamily="34" charset="0"/>
+              <a:buChar char="•"/>
+            </a:pPr>
+            <a:r>
+              <a:rPr lang="en-US" dirty="0"/>
+              <a:t>Nevada : More $$$ restaurants compared to per capita income</a:t>
+            </a:r>
+          </a:p>
+          <a:p>
+            <a:pPr marL="285750" indent="-285750">
+              <a:buFont typeface="Arial" panose="020B0604020202020204" pitchFamily="34" charset="0"/>
+              <a:buChar char="•"/>
+            </a:pPr>
+            <a:r>
+              <a:rPr lang="en-US" dirty="0"/>
+              <a:t>Washington and Puerto Rico : Problem in data collection</a:t>
+            </a:r>
           </a:p>
         </p:txBody>
       </p:sp>
     </p:spTree>
     <p:extLst>
       <p:ext uri="{BB962C8B-B14F-4D97-AF65-F5344CB8AC3E}">
-        <p14:creationId xmlns:p14="http://schemas.microsoft.com/office/powerpoint/2010/main" val="3102376774"/>
+        <p14:creationId xmlns:p14="http://schemas.microsoft.com/office/powerpoint/2010/main" val="2250977752"/>
       </p:ext>
     </p:extLst>
   </p:cSld>
@@ -4123,7 +4419,7 @@
           <p:cNvPr id="2" name="Title 1">
             <a:extLst>
               <a:ext uri="{FF2B5EF4-FFF2-40B4-BE49-F238E27FC236}">
-                <a16:creationId xmlns:a16="http://schemas.microsoft.com/office/drawing/2014/main" id="{30D72CAA-86AE-D240-8BF9-AE72ADE0F5EA}"/>
+                <a16:creationId xmlns:a16="http://schemas.microsoft.com/office/drawing/2014/main" id="{E1D4F8CE-A534-7A4D-A5F3-035D3A6F2481}"/>
               </a:ext>
             </a:extLst>
           </p:cNvPr>
@@ -4136,90 +4432,255 @@
         </p:nvSpPr>
         <p:spPr/>
         <p:txBody>
-          <a:bodyPr/>
-          <a:lstStyle/>
-          <a:p>
-            <a:r>
-              <a:rPr lang="en-US" dirty="0"/>
-              <a:t>Data Analysis-</a:t>
-            </a:r>
-            <a:r>
-              <a:rPr lang="en-US" dirty="0" err="1"/>
-              <a:t>Coel</a:t>
-            </a:r>
-            <a:endParaRPr lang="en-US" dirty="0"/>
-          </a:p>
-        </p:txBody>
-      </p:sp>
-      <p:sp>
-        <p:nvSpPr>
-          <p:cNvPr id="3" name="Content Placeholder 2">
+          <a:bodyPr>
+            <a:normAutofit fontScale="90000"/>
+          </a:bodyPr>
+          <a:lstStyle/>
+          <a:p>
+            <a:r>
+              <a:rPr lang="en-US" dirty="0"/>
+              <a:t>Maria-Does income per capita affect the popularity of $ restaurants?</a:t>
+            </a:r>
+          </a:p>
+        </p:txBody>
+      </p:sp>
+      <p:pic>
+        <p:nvPicPr>
+          <p:cNvPr id="8" name="Content Placeholder 7">
             <a:extLst>
               <a:ext uri="{FF2B5EF4-FFF2-40B4-BE49-F238E27FC236}">
-                <a16:creationId xmlns:a16="http://schemas.microsoft.com/office/drawing/2014/main" id="{65E54FE2-3120-A747-8A53-EF31D502AB5D}"/>
+                <a16:creationId xmlns:a16="http://schemas.microsoft.com/office/drawing/2014/main" id="{9CD1BC89-7FE5-5A4B-ABC1-3FEFF55E6C73}"/>
               </a:ext>
             </a:extLst>
           </p:cNvPr>
-          <p:cNvSpPr>
-            <a:spLocks noGrp="1"/>
-          </p:cNvSpPr>
+          <p:cNvPicPr>
+            <a:picLocks noGrp="1" noChangeAspect="1"/>
+          </p:cNvPicPr>
           <p:nvPr>
             <p:ph idx="1"/>
           </p:nvPr>
-        </p:nvSpPr>
-        <p:spPr/>
-        <p:txBody>
-          <a:bodyPr>
-            <a:normAutofit/>
-          </a:bodyPr>
-          <a:lstStyle/>
-          <a:p>
-            <a:r>
-              <a:rPr lang="en-US" dirty="0"/>
-              <a:t>Data Analysis</a:t>
-            </a:r>
-          </a:p>
-          <a:p>
-            <a:endParaRPr lang="en-US" dirty="0"/>
-          </a:p>
-          <a:p>
-            <a:r>
-              <a:rPr lang="en-US" dirty="0"/>
-              <a:t>Discuss the steps you took to analyze the data and answer each question you asked in your proposal</a:t>
-            </a:r>
-          </a:p>
-          <a:p>
-            <a:r>
-              <a:rPr lang="en-US" dirty="0"/>
-              <a:t>Present and discuss interesting figures developed during analysis, ideally with the help of </a:t>
-            </a:r>
-            <a:r>
-              <a:rPr lang="en-US" dirty="0" err="1"/>
-              <a:t>Jupyter</a:t>
-            </a:r>
-            <a:r>
-              <a:rPr lang="en-US" dirty="0"/>
-              <a:t> Notebook</a:t>
-            </a:r>
-          </a:p>
-          <a:p>
-            <a:r>
-              <a:rPr lang="en-US" dirty="0"/>
-              <a:t>Discuss your findings. Did you find what you expected to find? If not, why not? What inferences or general conclusions can you draw from your analysis?</a:t>
-            </a:r>
-          </a:p>
-          <a:p>
-            <a:endParaRPr lang="en-US" dirty="0"/>
-          </a:p>
-          <a:p>
-            <a:endParaRPr lang="en-US" dirty="0"/>
-          </a:p>
-        </p:txBody>
-      </p:sp>
+        </p:nvPicPr>
+        <p:blipFill>
+          <a:blip r:embed="rId2"/>
+          <a:stretch>
+            <a:fillRect/>
+          </a:stretch>
+        </p:blipFill>
+        <p:spPr>
+          <a:xfrm>
+            <a:off x="66502" y="2664423"/>
+            <a:ext cx="12010505" cy="1823500"/>
+          </a:xfrm>
+        </p:spPr>
+      </p:pic>
+      <p:graphicFrame>
+        <p:nvGraphicFramePr>
+          <p:cNvPr id="11" name="Table 10">
+            <a:extLst>
+              <a:ext uri="{FF2B5EF4-FFF2-40B4-BE49-F238E27FC236}">
+                <a16:creationId xmlns:a16="http://schemas.microsoft.com/office/drawing/2014/main" id="{A345EB6E-CC12-FB48-8C1C-ED67E7F0177C}"/>
+              </a:ext>
+            </a:extLst>
+          </p:cNvPr>
+          <p:cNvGraphicFramePr>
+            <a:graphicFrameLocks noGrp="1"/>
+          </p:cNvGraphicFramePr>
+          <p:nvPr>
+            <p:extLst>
+              <p:ext uri="{D42A27DB-BD31-4B8C-83A1-F6EECF244321}">
+                <p14:modId xmlns:p14="http://schemas.microsoft.com/office/powerpoint/2010/main" val="2037164317"/>
+              </p:ext>
+            </p:extLst>
+          </p:nvPr>
+        </p:nvGraphicFramePr>
+        <p:xfrm>
+          <a:off x="1749368" y="5133725"/>
+          <a:ext cx="8127999" cy="1112520"/>
+        </p:xfrm>
+        <a:graphic>
+          <a:graphicData uri="http://schemas.openxmlformats.org/drawingml/2006/table">
+            <a:tbl>
+              <a:tblPr firstRow="1" bandRow="1">
+                <a:tableStyleId>{5C22544A-7EE6-4342-B048-85BDC9FD1C3A}</a:tableStyleId>
+              </a:tblPr>
+              <a:tblGrid>
+                <a:gridCol w="2709333">
+                  <a:extLst>
+                    <a:ext uri="{9D8B030D-6E8A-4147-A177-3AD203B41FA5}">
+                      <a16:colId xmlns:a16="http://schemas.microsoft.com/office/drawing/2014/main" val="440816147"/>
+                    </a:ext>
+                  </a:extLst>
+                </a:gridCol>
+                <a:gridCol w="2709333">
+                  <a:extLst>
+                    <a:ext uri="{9D8B030D-6E8A-4147-A177-3AD203B41FA5}">
+                      <a16:colId xmlns:a16="http://schemas.microsoft.com/office/drawing/2014/main" val="1924619308"/>
+                    </a:ext>
+                  </a:extLst>
+                </a:gridCol>
+                <a:gridCol w="2709333">
+                  <a:extLst>
+                    <a:ext uri="{9D8B030D-6E8A-4147-A177-3AD203B41FA5}">
+                      <a16:colId xmlns:a16="http://schemas.microsoft.com/office/drawing/2014/main" val="2559205526"/>
+                    </a:ext>
+                  </a:extLst>
+                </a:gridCol>
+              </a:tblGrid>
+              <a:tr h="370840">
+                <a:tc>
+                  <a:txBody>
+                    <a:bodyPr/>
+                    <a:lstStyle/>
+                    <a:p>
+                      <a:pPr algn="ctr"/>
+                      <a:r>
+                        <a:rPr lang="en-US" dirty="0"/>
+                        <a:t>State</a:t>
+                      </a:r>
+                    </a:p>
+                  </a:txBody>
+                  <a:tcPr/>
+                </a:tc>
+                <a:tc>
+                  <a:txBody>
+                    <a:bodyPr/>
+                    <a:lstStyle/>
+                    <a:p>
+                      <a:pPr algn="ctr"/>
+                      <a:r>
+                        <a:rPr lang="en-US" dirty="0"/>
+                        <a:t>$$$</a:t>
+                      </a:r>
+                    </a:p>
+                  </a:txBody>
+                  <a:tcPr/>
+                </a:tc>
+                <a:tc>
+                  <a:txBody>
+                    <a:bodyPr/>
+                    <a:lstStyle/>
+                    <a:p>
+                      <a:pPr algn="ctr"/>
+                      <a:r>
+                        <a:rPr lang="en-US" dirty="0"/>
+                        <a:t>$</a:t>
+                      </a:r>
+                    </a:p>
+                  </a:txBody>
+                  <a:tcPr/>
+                </a:tc>
+                <a:extLst>
+                  <a:ext uri="{0D108BD9-81ED-4DB2-BD59-A6C34878D82A}">
+                    <a16:rowId xmlns:a16="http://schemas.microsoft.com/office/drawing/2014/main" val="1394859260"/>
+                  </a:ext>
+                </a:extLst>
+              </a:tr>
+              <a:tr h="370840">
+                <a:tc>
+                  <a:txBody>
+                    <a:bodyPr/>
+                    <a:lstStyle/>
+                    <a:p>
+                      <a:pPr algn="ctr"/>
+                      <a:r>
+                        <a:rPr lang="en-US" dirty="0"/>
+                        <a:t>MA</a:t>
+                      </a:r>
+                    </a:p>
+                  </a:txBody>
+                  <a:tcPr/>
+                </a:tc>
+                <a:tc>
+                  <a:txBody>
+                    <a:bodyPr/>
+                    <a:lstStyle/>
+                    <a:p>
+                      <a:pPr algn="ctr"/>
+                      <a:r>
+                        <a:rPr lang="en-US" dirty="0"/>
+                        <a:t>15</a:t>
+                      </a:r>
+                    </a:p>
+                  </a:txBody>
+                  <a:tcPr/>
+                </a:tc>
+                <a:tc>
+                  <a:txBody>
+                    <a:bodyPr/>
+                    <a:lstStyle/>
+                    <a:p>
+                      <a:pPr algn="ctr"/>
+                      <a:r>
+                        <a:rPr lang="en-US" dirty="0"/>
+                        <a:t>3</a:t>
+                      </a:r>
+                    </a:p>
+                  </a:txBody>
+                  <a:tcPr/>
+                </a:tc>
+                <a:extLst>
+                  <a:ext uri="{0D108BD9-81ED-4DB2-BD59-A6C34878D82A}">
+                    <a16:rowId xmlns:a16="http://schemas.microsoft.com/office/drawing/2014/main" val="597441644"/>
+                  </a:ext>
+                </a:extLst>
+              </a:tr>
+              <a:tr h="370840">
+                <a:tc>
+                  <a:txBody>
+                    <a:bodyPr/>
+                    <a:lstStyle/>
+                    <a:p>
+                      <a:pPr algn="ctr"/>
+                      <a:r>
+                        <a:rPr lang="en-US" dirty="0"/>
+                        <a:t>CA</a:t>
+                      </a:r>
+                    </a:p>
+                  </a:txBody>
+                  <a:tcPr/>
+                </a:tc>
+                <a:tc>
+                  <a:txBody>
+                    <a:bodyPr/>
+                    <a:lstStyle/>
+                    <a:p>
+                      <a:pPr algn="ctr"/>
+                      <a:r>
+                        <a:rPr lang="en-US" dirty="0"/>
+                        <a:t>2</a:t>
+                      </a:r>
+                    </a:p>
+                  </a:txBody>
+                  <a:tcPr/>
+                </a:tc>
+                <a:tc>
+                  <a:txBody>
+                    <a:bodyPr/>
+                    <a:lstStyle/>
+                    <a:p>
+                      <a:pPr algn="ctr"/>
+                      <a:r>
+                        <a:rPr lang="en-US" dirty="0"/>
+                        <a:t>10</a:t>
+                      </a:r>
+                    </a:p>
+                  </a:txBody>
+                  <a:tcPr/>
+                </a:tc>
+                <a:extLst>
+                  <a:ext uri="{0D108BD9-81ED-4DB2-BD59-A6C34878D82A}">
+                    <a16:rowId xmlns:a16="http://schemas.microsoft.com/office/drawing/2014/main" val="3912136622"/>
+                  </a:ext>
+                </a:extLst>
+              </a:tr>
+            </a:tbl>
+          </a:graphicData>
+        </a:graphic>
+      </p:graphicFrame>
     </p:spTree>
     <p:extLst>
       <p:ext uri="{BB962C8B-B14F-4D97-AF65-F5344CB8AC3E}">
-        <p14:creationId xmlns:p14="http://schemas.microsoft.com/office/powerpoint/2010/main" val="794689630"/>
+        <p14:creationId xmlns:p14="http://schemas.microsoft.com/office/powerpoint/2010/main" val="2920478348"/>
       </p:ext>
     </p:extLst>
   </p:cSld>
@@ -4251,7 +4712,7 @@
           <p:cNvPr id="2" name="Title 1">
             <a:extLst>
               <a:ext uri="{FF2B5EF4-FFF2-40B4-BE49-F238E27FC236}">
-                <a16:creationId xmlns:a16="http://schemas.microsoft.com/office/drawing/2014/main" id="{90C6AC86-6EBA-6848-955C-BE69B2959DD4}"/>
+                <a16:creationId xmlns:a16="http://schemas.microsoft.com/office/drawing/2014/main" id="{05224F8D-704B-C247-8FD9-537013E4E98D}"/>
               </a:ext>
             </a:extLst>
           </p:cNvPr>
@@ -4265,62 +4726,180 @@
         <p:spPr/>
         <p:txBody>
           <a:bodyPr>
-            <a:normAutofit/>
+            <a:normAutofit fontScale="90000"/>
           </a:bodyPr>
           <a:lstStyle/>
           <a:p>
             <a:r>
               <a:rPr lang="en-US" dirty="0"/>
-              <a:t>COEL-Post Mortem</a:t>
-            </a:r>
-            <a:br>
-              <a:rPr lang="en-US" dirty="0"/>
-            </a:br>
-            <a:endParaRPr lang="en-US" dirty="0"/>
-          </a:p>
-        </p:txBody>
-      </p:sp>
-      <p:sp>
-        <p:nvSpPr>
-          <p:cNvPr id="3" name="Content Placeholder 2">
-            <a:extLst>
-              <a:ext uri="{FF2B5EF4-FFF2-40B4-BE49-F238E27FC236}">
-                <a16:creationId xmlns:a16="http://schemas.microsoft.com/office/drawing/2014/main" id="{497B7C63-3284-4445-ACBF-9AD749173B04}"/>
-              </a:ext>
-            </a:extLst>
-          </p:cNvPr>
-          <p:cNvSpPr>
-            <a:spLocks noGrp="1"/>
-          </p:cNvSpPr>
-          <p:nvPr>
-            <p:ph idx="1"/>
-          </p:nvPr>
-        </p:nvSpPr>
-        <p:spPr/>
-        <p:txBody>
-          <a:bodyPr/>
-          <a:lstStyle/>
-          <a:p>
-            <a:endParaRPr lang="en-US" dirty="0"/>
-          </a:p>
-          <a:p>
-            <a:r>
-              <a:rPr lang="en-US" dirty="0"/>
-              <a:t>  Discuss any difficulties that arose, and how you dealt with them</a:t>
-            </a:r>
-          </a:p>
-          <a:p>
-            <a:r>
-              <a:rPr lang="en-US" dirty="0"/>
-              <a:t>  Discuss any additional questions that came up, but which you didn't have time to answer: What would you research next, if you had two more weeks?</a:t>
-            </a:r>
-          </a:p>
-        </p:txBody>
-      </p:sp>
+              <a:t>Maria-Income per capital does impact the number of $$$ Restaurants</a:t>
+            </a:r>
+          </a:p>
+        </p:txBody>
+      </p:sp>
+      <mc:AlternateContent xmlns:mc="http://schemas.openxmlformats.org/markup-compatibility/2006">
+        <mc:Choice xmlns:a14="http://schemas.microsoft.com/office/drawing/2010/main" Requires="a14">
+          <p:sp>
+            <p:nvSpPr>
+              <p:cNvPr id="3" name="Content Placeholder 2">
+                <a:extLst>
+                  <a:ext uri="{FF2B5EF4-FFF2-40B4-BE49-F238E27FC236}">
+                    <a16:creationId xmlns:a16="http://schemas.microsoft.com/office/drawing/2014/main" id="{42892E50-AC83-3548-B24D-0E06A4A29AB5}"/>
+                  </a:ext>
+                </a:extLst>
+              </p:cNvPr>
+              <p:cNvSpPr>
+                <a:spLocks noGrp="1"/>
+              </p:cNvSpPr>
+              <p:nvPr>
+                <p:ph idx="1"/>
+              </p:nvPr>
+            </p:nvSpPr>
+            <p:spPr/>
+            <p:txBody>
+              <a:bodyPr/>
+              <a:lstStyle/>
+              <a:p>
+                <a14:m>
+                  <m:oMath xmlns:m="http://schemas.openxmlformats.org/officeDocument/2006/math">
+                    <m:sSub>
+                      <m:sSubPr>
+                        <m:ctrlPr>
+                          <a:rPr lang="en-US" i="1" smtClean="0">
+                            <a:latin typeface="Cambria Math" panose="02040503050406030204" pitchFamily="18" charset="0"/>
+                          </a:rPr>
+                        </m:ctrlPr>
+                      </m:sSubPr>
+                      <m:e>
+                        <m:r>
+                          <a:rPr lang="en-US" b="0" i="1" smtClean="0">
+                            <a:latin typeface="Cambria Math" panose="02040503050406030204" pitchFamily="18" charset="0"/>
+                          </a:rPr>
+                          <m:t>𝐻</m:t>
+                        </m:r>
+                      </m:e>
+                      <m:sub>
+                        <m:r>
+                          <a:rPr lang="en-US" b="0" i="1" smtClean="0">
+                            <a:latin typeface="Cambria Math" panose="02040503050406030204" pitchFamily="18" charset="0"/>
+                          </a:rPr>
+                          <m:t>1</m:t>
+                        </m:r>
+                      </m:sub>
+                    </m:sSub>
+                  </m:oMath>
+                </a14:m>
+                <a:r>
+                  <a:rPr lang="en-US" dirty="0"/>
+                  <a:t>  	States with a higher income per capita have a greater number of $$$ 	restaurants than states with a lower income per capita</a:t>
+                </a:r>
+              </a:p>
+              <a:p>
+                <a14:m>
+                  <m:oMath xmlns:m="http://schemas.openxmlformats.org/officeDocument/2006/math">
+                    <m:sSub>
+                      <m:sSubPr>
+                        <m:ctrlPr>
+                          <a:rPr lang="en-US" i="1" smtClean="0">
+                            <a:latin typeface="Cambria Math" panose="02040503050406030204" pitchFamily="18" charset="0"/>
+                          </a:rPr>
+                        </m:ctrlPr>
+                      </m:sSubPr>
+                      <m:e>
+                        <m:r>
+                          <a:rPr lang="en-US" b="0" i="1" smtClean="0">
+                            <a:latin typeface="Cambria Math" panose="02040503050406030204" pitchFamily="18" charset="0"/>
+                          </a:rPr>
+                          <m:t>𝐻</m:t>
+                        </m:r>
+                      </m:e>
+                      <m:sub>
+                        <m:r>
+                          <a:rPr lang="en-US" b="0" i="1" smtClean="0">
+                            <a:latin typeface="Cambria Math" panose="02040503050406030204" pitchFamily="18" charset="0"/>
+                          </a:rPr>
+                          <m:t>0</m:t>
+                        </m:r>
+                      </m:sub>
+                    </m:sSub>
+                  </m:oMath>
+                </a14:m>
+                <a:r>
+                  <a:rPr lang="en-US" dirty="0"/>
+                  <a:t>  	States with a higher income per capita do not have a greater number of 	$$$ restaurants than states with a lower income per capita</a:t>
+                </a:r>
+              </a:p>
+              <a:p>
+                <a:r>
+                  <a:rPr lang="en-US" dirty="0"/>
+                  <a:t>Ratio of income per capita to the number of $ and $$$ restaurants </a:t>
+                </a:r>
+              </a:p>
+              <a:p>
+                <a:r>
+                  <a:rPr lang="en-US" i="1" dirty="0"/>
+                  <a:t>T-statistics: -1.6737008943531222</a:t>
+                </a:r>
+              </a:p>
+              <a:p>
+                <a:r>
+                  <a:rPr lang="en-US" i="1" dirty="0"/>
+                  <a:t>P-Value: 0.09738386597476226</a:t>
+                </a:r>
+              </a:p>
+              <a:p>
+                <a:r>
+                  <a:rPr lang="en-US" i="1" dirty="0"/>
+                  <a:t>P-Value is &lt; 0.05 which means we reject the null hypothesis </a:t>
+                </a:r>
+              </a:p>
+            </p:txBody>
+          </p:sp>
+        </mc:Choice>
+        <mc:Fallback>
+          <p:sp>
+            <p:nvSpPr>
+              <p:cNvPr id="3" name="Content Placeholder 2">
+                <a:extLst>
+                  <a:ext uri="{FF2B5EF4-FFF2-40B4-BE49-F238E27FC236}">
+                    <a16:creationId xmlns:a16="http://schemas.microsoft.com/office/drawing/2014/main" id="{42892E50-AC83-3548-B24D-0E06A4A29AB5}"/>
+                  </a:ext>
+                </a:extLst>
+              </p:cNvPr>
+              <p:cNvSpPr>
+                <a:spLocks noGrp="1" noRot="1" noChangeAspect="1" noMove="1" noResize="1" noEditPoints="1" noAdjustHandles="1" noChangeArrowheads="1" noChangeShapeType="1" noTextEdit="1"/>
+              </p:cNvSpPr>
+              <p:nvPr>
+                <p:ph idx="1"/>
+              </p:nvPr>
+            </p:nvSpPr>
+            <p:spPr>
+              <a:blipFill>
+                <a:blip r:embed="rId2"/>
+                <a:stretch>
+                  <a:fillRect l="-493" t="-816" r="-1149"/>
+                </a:stretch>
+              </a:blipFill>
+            </p:spPr>
+            <p:txBody>
+              <a:bodyPr/>
+              <a:lstStyle/>
+              <a:p>
+                <a:r>
+                  <a:rPr lang="en-US">
+                    <a:noFill/>
+                  </a:rPr>
+                  <a:t> </a:t>
+                </a:r>
+              </a:p>
+            </p:txBody>
+          </p:sp>
+        </mc:Fallback>
+      </mc:AlternateContent>
     </p:spTree>
     <p:extLst>
       <p:ext uri="{BB962C8B-B14F-4D97-AF65-F5344CB8AC3E}">
-        <p14:creationId xmlns:p14="http://schemas.microsoft.com/office/powerpoint/2010/main" val="654083922"/>
+        <p14:creationId xmlns:p14="http://schemas.microsoft.com/office/powerpoint/2010/main" val="1837661727"/>
       </p:ext>
     </p:extLst>
   </p:cSld>

</xml_diff>